<commit_message>
Update PPT page number
</commit_message>
<xml_diff>
--- a/PPT/190302/LWW_labmeeting_19mar02.pptx
+++ b/PPT/190302/LWW_labmeeting_19mar02.pptx
@@ -11263,7 +11263,15 @@
           <a:p>
             <a:r>
               <a:rPr lang="en-US" altLang="ko-KR" dirty="0" smtClean="0"/>
-              <a:t>- 7 -</a:t>
+              <a:t>- </a:t>
+            </a:r>
+            <a:r>
+              <a:rPr lang="en-US" altLang="ko-KR" dirty="0" smtClean="0"/>
+              <a:t>8 </a:t>
+            </a:r>
+            <a:r>
+              <a:rPr lang="en-US" altLang="ko-KR" dirty="0" smtClean="0"/>
+              <a:t>-</a:t>
             </a:r>
             <a:endParaRPr lang="ko-KR" altLang="en-US" dirty="0"/>
           </a:p>
@@ -14374,7 +14382,15 @@
           <a:p>
             <a:r>
               <a:rPr lang="en-US" altLang="ko-KR" dirty="0" smtClean="0"/>
-              <a:t>- 7 -</a:t>
+              <a:t>- </a:t>
+            </a:r>
+            <a:r>
+              <a:rPr lang="en-US" altLang="ko-KR" dirty="0" smtClean="0"/>
+              <a:t>9 </a:t>
+            </a:r>
+            <a:r>
+              <a:rPr lang="en-US" altLang="ko-KR" dirty="0" smtClean="0"/>
+              <a:t>-</a:t>
             </a:r>
             <a:endParaRPr lang="ko-KR" altLang="en-US" dirty="0"/>
           </a:p>
@@ -18259,11 +18275,7 @@
             </a:pPr>
             <a:r>
               <a:rPr lang="en-US" altLang="ko-KR" dirty="0" smtClean="0"/>
-              <a:t>It </a:t>
-            </a:r>
-            <a:r>
-              <a:rPr lang="en-US" altLang="ko-KR" dirty="0" smtClean="0"/>
-              <a:t>is </a:t>
+              <a:t>It is </a:t>
             </a:r>
             <a:r>
               <a:rPr lang="en-US" altLang="ko-KR" dirty="0"/>
@@ -18284,8 +18296,8 @@
         </p:nvSpPr>
         <p:spPr>
           <a:xfrm>
-            <a:off x="4273222" y="6514574"/>
-            <a:ext cx="595035" cy="369332"/>
+            <a:off x="4273221" y="6514574"/>
+            <a:ext cx="723275" cy="369332"/>
           </a:xfrm>
           <a:prstGeom prst="rect">
             <a:avLst/>
@@ -18300,7 +18312,15 @@
           <a:p>
             <a:r>
               <a:rPr lang="en-US" altLang="ko-KR" dirty="0" smtClean="0"/>
-              <a:t>- 7 -</a:t>
+              <a:t>- </a:t>
+            </a:r>
+            <a:r>
+              <a:rPr lang="en-US" altLang="ko-KR" dirty="0" smtClean="0"/>
+              <a:t>10 </a:t>
+            </a:r>
+            <a:r>
+              <a:rPr lang="en-US" altLang="ko-KR" dirty="0" smtClean="0"/>
+              <a:t>-</a:t>
             </a:r>
             <a:endParaRPr lang="ko-KR" altLang="en-US" dirty="0"/>
           </a:p>
@@ -23130,19 +23150,7 @@
             </a:r>
             <a:r>
               <a:rPr lang="en-US" altLang="ko-KR" dirty="0" smtClean="0"/>
-              <a:t>, I </a:t>
-            </a:r>
-            <a:r>
-              <a:rPr lang="en-US" altLang="ko-KR" dirty="0" smtClean="0"/>
-              <a:t>think that FC </a:t>
-            </a:r>
-            <a:r>
-              <a:rPr lang="en-US" altLang="ko-KR" dirty="0" smtClean="0"/>
-              <a:t>has a lot of problem (FC </a:t>
-            </a:r>
-            <a:r>
-              <a:rPr lang="en-US" altLang="ko-KR" dirty="0" smtClean="0"/>
-              <a:t>= Fully Connected)</a:t>
+              <a:t>, I think that FC has a lot of problem (FC = Fully Connected)</a:t>
             </a:r>
             <a:endParaRPr lang="en-US" altLang="ko-KR" dirty="0"/>
           </a:p>
@@ -23211,7 +23219,7 @@
         <p:spPr>
           <a:xfrm>
             <a:off x="4273222" y="6514574"/>
-            <a:ext cx="595035" cy="369332"/>
+            <a:ext cx="706155" cy="369332"/>
           </a:xfrm>
           <a:prstGeom prst="rect">
             <a:avLst/>
@@ -23226,7 +23234,15 @@
           <a:p>
             <a:r>
               <a:rPr lang="en-US" altLang="ko-KR" dirty="0" smtClean="0"/>
-              <a:t>- 6 -</a:t>
+              <a:t>- </a:t>
+            </a:r>
+            <a:r>
+              <a:rPr lang="en-US" altLang="ko-KR" dirty="0" smtClean="0"/>
+              <a:t>11 </a:t>
+            </a:r>
+            <a:r>
+              <a:rPr lang="en-US" altLang="ko-KR" dirty="0" smtClean="0"/>
+              <a:t>-</a:t>
             </a:r>
             <a:endParaRPr lang="ko-KR" altLang="en-US" dirty="0"/>
           </a:p>
@@ -26369,13 +26385,8 @@
             </a:r>
             <a:r>
               <a:rPr lang="en-US" altLang="ko-KR" dirty="0" smtClean="0"/>
-              <a:t>N</a:t>
+              <a:t>N’ model</a:t>
             </a:r>
-            <a:r>
-              <a:rPr lang="en-US" altLang="ko-KR" dirty="0" smtClean="0"/>
-              <a:t>’ model</a:t>
-            </a:r>
-            <a:endParaRPr lang="en-US" altLang="ko-KR" dirty="0" smtClean="0"/>
           </a:p>
         </p:txBody>
       </p:sp>
@@ -26388,7 +26399,7 @@
         <p:spPr>
           <a:xfrm>
             <a:off x="4273222" y="6514574"/>
-            <a:ext cx="595035" cy="369332"/>
+            <a:ext cx="723275" cy="369332"/>
           </a:xfrm>
           <a:prstGeom prst="rect">
             <a:avLst/>
@@ -26403,7 +26414,15 @@
           <a:p>
             <a:r>
               <a:rPr lang="en-US" altLang="ko-KR" dirty="0" smtClean="0"/>
-              <a:t>- 6 -</a:t>
+              <a:t>- </a:t>
+            </a:r>
+            <a:r>
+              <a:rPr lang="en-US" altLang="ko-KR" dirty="0" smtClean="0"/>
+              <a:t>12 </a:t>
+            </a:r>
+            <a:r>
+              <a:rPr lang="en-US" altLang="ko-KR" dirty="0" smtClean="0"/>
+              <a:t>-</a:t>
             </a:r>
             <a:endParaRPr lang="ko-KR" altLang="en-US" dirty="0"/>
           </a:p>
@@ -29526,15 +29545,7 @@
             </a:pPr>
             <a:r>
               <a:rPr lang="en-US" altLang="ko-KR" dirty="0" smtClean="0"/>
-              <a:t>Let’s focus </a:t>
-            </a:r>
-            <a:r>
-              <a:rPr lang="en-US" altLang="ko-KR" dirty="0" smtClean="0"/>
-              <a:t>on the </a:t>
-            </a:r>
-            <a:r>
-              <a:rPr lang="en-US" altLang="ko-KR" dirty="0" smtClean="0"/>
-              <a:t>accuracy </a:t>
+              <a:t>Let’s focus on the accuracy </a:t>
             </a:r>
             <a:r>
               <a:rPr lang="en-US" altLang="ko-KR" dirty="0"/>
@@ -29567,7 +29578,7 @@
         <p:spPr>
           <a:xfrm>
             <a:off x="4273222" y="6514574"/>
-            <a:ext cx="595035" cy="369332"/>
+            <a:ext cx="723275" cy="369332"/>
           </a:xfrm>
           <a:prstGeom prst="rect">
             <a:avLst/>
@@ -29582,7 +29593,15 @@
           <a:p>
             <a:r>
               <a:rPr lang="en-US" altLang="ko-KR" dirty="0" smtClean="0"/>
-              <a:t>- 7 -</a:t>
+              <a:t>- </a:t>
+            </a:r>
+            <a:r>
+              <a:rPr lang="en-US" altLang="ko-KR" dirty="0" smtClean="0"/>
+              <a:t>13 </a:t>
+            </a:r>
+            <a:r>
+              <a:rPr lang="en-US" altLang="ko-KR" dirty="0" smtClean="0"/>
+              <a:t>-</a:t>
             </a:r>
             <a:endParaRPr lang="ko-KR" altLang="en-US" dirty="0"/>
           </a:p>
@@ -33181,7 +33200,7 @@
         <p:spPr>
           <a:xfrm>
             <a:off x="4273222" y="6514574"/>
-            <a:ext cx="595035" cy="369332"/>
+            <a:ext cx="723275" cy="369332"/>
           </a:xfrm>
           <a:prstGeom prst="rect">
             <a:avLst/>
@@ -33196,14 +33215,22 @@
           <a:p>
             <a:r>
               <a:rPr lang="en-US" altLang="ko-KR" dirty="0" smtClean="0"/>
-              <a:t>- 7 -</a:t>
+              <a:t>- </a:t>
+            </a:r>
+            <a:r>
+              <a:rPr lang="en-US" altLang="ko-KR" dirty="0" smtClean="0"/>
+              <a:t>14 </a:t>
+            </a:r>
+            <a:r>
+              <a:rPr lang="en-US" altLang="ko-KR" dirty="0" smtClean="0"/>
+              <a:t>-</a:t>
             </a:r>
             <a:endParaRPr lang="ko-KR" altLang="en-US" dirty="0"/>
           </a:p>
         </p:txBody>
       </p:sp>
-      <mc:AlternateContent xmlns:mc="http://schemas.openxmlformats.org/markup-compatibility/2006">
-        <mc:Choice xmlns:a14="http://schemas.microsoft.com/office/drawing/2010/main" Requires="a14">
+      <mc:AlternateContent xmlns:mc="http://schemas.openxmlformats.org/markup-compatibility/2006" xmlns:a14="http://schemas.microsoft.com/office/drawing/2010/main">
+        <mc:Choice Requires="a14">
           <p:graphicFrame>
             <p:nvGraphicFramePr>
               <p:cNvPr id="19" name="표 18"/>
@@ -34487,7 +34514,7 @@
             </a:graphic>
           </p:graphicFrame>
         </mc:Choice>
-        <mc:Fallback>
+        <mc:Fallback xmlns="">
           <p:graphicFrame>
             <p:nvGraphicFramePr>
               <p:cNvPr id="19" name="표 18"/>
@@ -35114,8 +35141,8 @@
           </p:graphicFrame>
         </mc:Fallback>
       </mc:AlternateContent>
-      <mc:AlternateContent xmlns:mc="http://schemas.openxmlformats.org/markup-compatibility/2006">
-        <mc:Choice xmlns:a14="http://schemas.microsoft.com/office/drawing/2010/main" Requires="a14">
+      <mc:AlternateContent xmlns:mc="http://schemas.openxmlformats.org/markup-compatibility/2006" xmlns:a14="http://schemas.microsoft.com/office/drawing/2010/main">
+        <mc:Choice Requires="a14">
           <p:graphicFrame>
             <p:nvGraphicFramePr>
               <p:cNvPr id="6" name="표 5"/>
@@ -35904,7 +35931,7 @@
             </a:graphic>
           </p:graphicFrame>
         </mc:Choice>
-        <mc:Fallback>
+        <mc:Fallback xmlns="">
           <p:graphicFrame>
             <p:nvGraphicFramePr>
               <p:cNvPr id="6" name="표 5"/>
@@ -36744,7 +36771,7 @@
         <p:spPr>
           <a:xfrm>
             <a:off x="4273222" y="6514574"/>
-            <a:ext cx="595035" cy="369332"/>
+            <a:ext cx="723275" cy="369332"/>
           </a:xfrm>
           <a:prstGeom prst="rect">
             <a:avLst/>
@@ -36759,7 +36786,15 @@
           <a:p>
             <a:r>
               <a:rPr lang="en-US" altLang="ko-KR" dirty="0" smtClean="0"/>
-              <a:t>- 2 -</a:t>
+              <a:t>- </a:t>
+            </a:r>
+            <a:r>
+              <a:rPr lang="en-US" altLang="ko-KR" dirty="0" smtClean="0"/>
+              <a:t>15 </a:t>
+            </a:r>
+            <a:r>
+              <a:rPr lang="en-US" altLang="ko-KR" dirty="0" smtClean="0"/>
+              <a:t>-</a:t>
             </a:r>
             <a:endParaRPr lang="ko-KR" altLang="en-US" dirty="0"/>
           </a:p>
@@ -43843,7 +43878,6 @@
               <a:rPr lang="en-US" altLang="ko-KR" sz="2000" dirty="0" smtClean="0"/>
               <a:t>I found out that the number of parameter is important as well as accuracy</a:t>
             </a:r>
-            <a:endParaRPr lang="en-US" altLang="ko-KR" sz="2000" dirty="0" smtClean="0"/>
           </a:p>
           <a:p>
             <a:pPr marL="285840" indent="-284400">
@@ -43858,15 +43892,7 @@
             </a:pPr>
             <a:r>
               <a:rPr lang="en-US" altLang="ko-KR" dirty="0" smtClean="0"/>
-              <a:t>And </a:t>
-            </a:r>
-            <a:r>
-              <a:rPr lang="en-US" altLang="ko-KR" dirty="0" smtClean="0"/>
-              <a:t>I asserted</a:t>
-            </a:r>
-            <a:r>
-              <a:rPr lang="en-US" altLang="ko-KR" dirty="0" smtClean="0"/>
-              <a:t> </a:t>
+              <a:t>And I asserted </a:t>
             </a:r>
             <a:r>
               <a:rPr lang="en-US" altLang="ko-KR" dirty="0"/>

</xml_diff>